<commit_message>
LogSoure - Auto source id creation
</commit_message>
<xml_diff>
--- a/Doc/Aquarius.pptx
+++ b/Doc/Aquarius.pptx
@@ -6,6 +6,7 @@
   </p:sldMasterIdLst>
   <p:sldIdLst>
     <p:sldId id="256" r:id="rId2"/>
+    <p:sldId id="257" r:id="rId3"/>
   </p:sldIdLst>
   <p:sldSz cx="12192000" cy="6858000"/>
   <p:notesSz cx="6858000" cy="9144000"/>
@@ -337,7 +338,7 @@
             <a:fld id="{B61BEF0D-F0BB-DE4B-95CE-6DB70DBA9567}" type="datetimeFigureOut">
               <a:rPr lang="en-US" dirty="0"/>
               <a:pPr/>
-              <a:t>11/21/2020</a:t>
+              <a:t>12/20/2020</a:t>
             </a:fld>
             <a:endParaRPr lang="en-US" dirty="0"/>
           </a:p>
@@ -668,7 +669,7 @@
             <a:fld id="{B61BEF0D-F0BB-DE4B-95CE-6DB70DBA9567}" type="datetimeFigureOut">
               <a:rPr lang="en-US" dirty="0"/>
               <a:pPr/>
-              <a:t>11/21/2020</a:t>
+              <a:t>12/20/2020</a:t>
             </a:fld>
             <a:endParaRPr lang="en-US" dirty="0"/>
           </a:p>
@@ -943,7 +944,7 @@
             <a:fld id="{B61BEF0D-F0BB-DE4B-95CE-6DB70DBA9567}" type="datetimeFigureOut">
               <a:rPr lang="en-US" dirty="0"/>
               <a:pPr/>
-              <a:t>11/21/2020</a:t>
+              <a:t>12/20/2020</a:t>
             </a:fld>
             <a:endParaRPr lang="en-US" dirty="0"/>
           </a:p>
@@ -1019,7 +1020,7 @@
       </p:grpSpPr>
       <p:pic>
         <p:nvPicPr>
-          <p:cNvPr id="16" name="Picture 15" descr="Celestia-R1---OverlayContentHD.png"/>
+          <p:cNvPr id="11" name="Picture 10" descr="Celestia-R1---OverlayContentHD.png"/>
           <p:cNvPicPr>
             <a:picLocks noChangeAspect="1"/>
           </p:cNvPicPr>
@@ -1049,7 +1050,7 @@
       </p:pic>
       <p:sp>
         <p:nvSpPr>
-          <p:cNvPr id="15" name="TextBox 14"/>
+          <p:cNvPr id="13" name="TextBox 12"/>
           <p:cNvSpPr txBox="1"/>
           <p:nvPr/>
         </p:nvSpPr>
@@ -1165,7 +1166,7 @@
       </p:sp>
       <p:sp>
         <p:nvSpPr>
-          <p:cNvPr id="11" name="TextBox 10"/>
+          <p:cNvPr id="14" name="TextBox 13"/>
           <p:cNvSpPr txBox="1"/>
           <p:nvPr/>
         </p:nvSpPr>
@@ -1281,7 +1282,7 @@
       </p:sp>
       <p:sp>
         <p:nvSpPr>
-          <p:cNvPr id="2" name="Title 1"/>
+          <p:cNvPr id="16" name="Title 1"/>
           <p:cNvSpPr>
             <a:spLocks noGrp="1"/>
           </p:cNvSpPr>
@@ -1508,7 +1509,7 @@
             <a:fld id="{B61BEF0D-F0BB-DE4B-95CE-6DB70DBA9567}" type="datetimeFigureOut">
               <a:rPr lang="en-US" dirty="0"/>
               <a:pPr/>
-              <a:t>11/21/2020</a:t>
+              <a:t>12/20/2020</a:t>
             </a:fld>
             <a:endParaRPr lang="en-US" dirty="0"/>
           </a:p>
@@ -1584,7 +1585,7 @@
       </p:grpSpPr>
       <p:pic>
         <p:nvPicPr>
-          <p:cNvPr id="8" name="Picture 7" descr="Celestia-R1---OverlayContentHD.png"/>
+          <p:cNvPr id="7" name="Picture 6" descr="Celestia-R1---OverlayContentHD.png"/>
           <p:cNvPicPr>
             <a:picLocks noChangeAspect="1"/>
           </p:cNvPicPr>
@@ -1783,7 +1784,7 @@
             <a:fld id="{B61BEF0D-F0BB-DE4B-95CE-6DB70DBA9567}" type="datetimeFigureOut">
               <a:rPr lang="en-US" dirty="0"/>
               <a:pPr/>
-              <a:t>11/21/2020</a:t>
+              <a:t>12/20/2020</a:t>
             </a:fld>
             <a:endParaRPr lang="en-US" dirty="0"/>
           </a:p>
@@ -2342,7 +2343,7 @@
             <a:fld id="{B61BEF0D-F0BB-DE4B-95CE-6DB70DBA9567}" type="datetimeFigureOut">
               <a:rPr lang="en-US" dirty="0"/>
               <a:pPr/>
-              <a:t>11/21/2020</a:t>
+              <a:t>12/20/2020</a:t>
             </a:fld>
             <a:endParaRPr lang="en-US" dirty="0"/>
           </a:p>
@@ -2666,7 +2667,7 @@
             <a:fld id="{B61BEF0D-F0BB-DE4B-95CE-6DB70DBA9567}" type="datetimeFigureOut">
               <a:rPr lang="en-US" dirty="0"/>
               <a:pPr/>
-              <a:t>11/21/2020</a:t>
+              <a:t>12/20/2020</a:t>
             </a:fld>
             <a:endParaRPr lang="en-US" dirty="0"/>
           </a:p>
@@ -2772,6 +2773,34 @@
       </p:pic>
       <p:sp>
         <p:nvSpPr>
+          <p:cNvPr id="8" name="Title 1"/>
+          <p:cNvSpPr>
+            <a:spLocks noGrp="1"/>
+          </p:cNvSpPr>
+          <p:nvPr>
+            <p:ph type="title"/>
+          </p:nvPr>
+        </p:nvSpPr>
+        <p:spPr>
+          <a:xfrm>
+            <a:off x="685801" y="609600"/>
+            <a:ext cx="10131425" cy="1456267"/>
+          </a:xfrm>
+        </p:spPr>
+        <p:txBody>
+          <a:bodyPr/>
+          <a:lstStyle/>
+          <a:p>
+            <a:r>
+              <a:rPr lang="de-DE"/>
+              <a:t>Mastertitelformat bearbeiten</a:t>
+            </a:r>
+            <a:endParaRPr lang="en-US" dirty="0"/>
+          </a:p>
+        </p:txBody>
+      </p:sp>
+      <p:sp>
+        <p:nvSpPr>
           <p:cNvPr id="3" name="Vertical Text Placeholder 2"/>
           <p:cNvSpPr>
             <a:spLocks noGrp="1"/>
@@ -2840,7 +2869,7 @@
             <a:fld id="{B61BEF0D-F0BB-DE4B-95CE-6DB70DBA9567}" type="datetimeFigureOut">
               <a:rPr lang="en-US" dirty="0"/>
               <a:pPr/>
-              <a:t>11/21/2020</a:t>
+              <a:t>12/20/2020</a:t>
             </a:fld>
             <a:endParaRPr lang="en-US" dirty="0"/>
           </a:p>
@@ -2885,34 +2914,6 @@
               <a:pPr/>
               <a:t>‹Nr.›</a:t>
             </a:fld>
-            <a:endParaRPr lang="en-US" dirty="0"/>
-          </a:p>
-        </p:txBody>
-      </p:sp>
-      <p:sp>
-        <p:nvSpPr>
-          <p:cNvPr id="8" name="Title 1"/>
-          <p:cNvSpPr>
-            <a:spLocks noGrp="1"/>
-          </p:cNvSpPr>
-          <p:nvPr>
-            <p:ph type="title"/>
-          </p:nvPr>
-        </p:nvSpPr>
-        <p:spPr>
-          <a:xfrm>
-            <a:off x="685801" y="609600"/>
-            <a:ext cx="10131425" cy="1456267"/>
-          </a:xfrm>
-        </p:spPr>
-        <p:txBody>
-          <a:bodyPr/>
-          <a:lstStyle/>
-          <a:p>
-            <a:r>
-              <a:rPr lang="de-DE"/>
-              <a:t>Mastertitelformat bearbeiten</a:t>
-            </a:r>
             <a:endParaRPr lang="en-US" dirty="0"/>
           </a:p>
         </p:txBody>
@@ -3075,7 +3076,7 @@
             <a:fld id="{B61BEF0D-F0BB-DE4B-95CE-6DB70DBA9567}" type="datetimeFigureOut">
               <a:rPr lang="en-US" dirty="0"/>
               <a:pPr/>
-              <a:t>11/21/2020</a:t>
+              <a:t>12/20/2020</a:t>
             </a:fld>
             <a:endParaRPr lang="en-US" dirty="0"/>
           </a:p>
@@ -3272,7 +3273,7 @@
             <a:fld id="{B61BEF0D-F0BB-DE4B-95CE-6DB70DBA9567}" type="datetimeFigureOut">
               <a:rPr lang="en-US" dirty="0"/>
               <a:pPr/>
-              <a:t>11/21/2020</a:t>
+              <a:t>12/20/2020</a:t>
             </a:fld>
             <a:endParaRPr lang="en-US" dirty="0"/>
           </a:p>
@@ -3545,7 +3546,7 @@
             <a:fld id="{B61BEF0D-F0BB-DE4B-95CE-6DB70DBA9567}" type="datetimeFigureOut">
               <a:rPr lang="en-US" dirty="0"/>
               <a:pPr/>
-              <a:t>11/21/2020</a:t>
+              <a:t>12/20/2020</a:t>
             </a:fld>
             <a:endParaRPr lang="en-US" dirty="0"/>
           </a:p>
@@ -3808,7 +3809,7 @@
             <a:fld id="{B61BEF0D-F0BB-DE4B-95CE-6DB70DBA9567}" type="datetimeFigureOut">
               <a:rPr lang="en-US" dirty="0"/>
               <a:pPr/>
-              <a:t>11/21/2020</a:t>
+              <a:t>12/20/2020</a:t>
             </a:fld>
             <a:endParaRPr lang="en-US" dirty="0"/>
           </a:p>
@@ -4179,7 +4180,7 @@
             <a:fld id="{B61BEF0D-F0BB-DE4B-95CE-6DB70DBA9567}" type="datetimeFigureOut">
               <a:rPr lang="en-US" dirty="0"/>
               <a:pPr/>
-              <a:t>11/21/2020</a:t>
+              <a:t>12/20/2020</a:t>
             </a:fld>
             <a:endParaRPr lang="en-US" dirty="0"/>
           </a:p>
@@ -4324,7 +4325,7 @@
             <a:fld id="{B61BEF0D-F0BB-DE4B-95CE-6DB70DBA9567}" type="datetimeFigureOut">
               <a:rPr lang="en-US" dirty="0"/>
               <a:pPr/>
-              <a:t>11/21/2020</a:t>
+              <a:t>12/20/2020</a:t>
             </a:fld>
             <a:endParaRPr lang="en-US" dirty="0"/>
           </a:p>
@@ -4446,7 +4447,7 @@
             <a:fld id="{B61BEF0D-F0BB-DE4B-95CE-6DB70DBA9567}" type="datetimeFigureOut">
               <a:rPr lang="en-US" dirty="0"/>
               <a:pPr/>
-              <a:t>11/21/2020</a:t>
+              <a:t>12/20/2020</a:t>
             </a:fld>
             <a:endParaRPr lang="en-US" dirty="0"/>
           </a:p>
@@ -4728,7 +4729,7 @@
             <a:fld id="{B61BEF0D-F0BB-DE4B-95CE-6DB70DBA9567}" type="datetimeFigureOut">
               <a:rPr lang="en-US" dirty="0"/>
               <a:pPr/>
-              <a:t>11/21/2020</a:t>
+              <a:t>12/20/2020</a:t>
             </a:fld>
             <a:endParaRPr lang="en-US" dirty="0"/>
           </a:p>
@@ -5049,7 +5050,7 @@
             <a:fld id="{B61BEF0D-F0BB-DE4B-95CE-6DB70DBA9567}" type="datetimeFigureOut">
               <a:rPr lang="en-US" dirty="0"/>
               <a:pPr/>
-              <a:t>11/21/2020</a:t>
+              <a:t>12/20/2020</a:t>
             </a:fld>
             <a:endParaRPr lang="en-US" dirty="0"/>
           </a:p>
@@ -5260,7 +5261,7 @@
             <a:fld id="{B61BEF0D-F0BB-DE4B-95CE-6DB70DBA9567}" type="datetimeFigureOut">
               <a:rPr lang="en-US" dirty="0"/>
               <a:pPr/>
-              <a:t>11/21/2020</a:t>
+              <a:t>12/20/2020</a:t>
             </a:fld>
             <a:endParaRPr lang="en-US" dirty="0"/>
           </a:p>
@@ -5362,7 +5363,7 @@
     <p:sldLayoutId id="2147483663" r:id="rId11"/>
     <p:sldLayoutId id="2147483664" r:id="rId12"/>
     <p:sldLayoutId id="2147483665" r:id="rId13"/>
-    <p:sldLayoutId id="2147483668" r:id="rId14"/>
+    <p:sldLayoutId id="2147483666" r:id="rId14"/>
     <p:sldLayoutId id="2147483667" r:id="rId15"/>
     <p:sldLayoutId id="2147483658" r:id="rId16"/>
     <p:sldLayoutId id="2147483659" r:id="rId17"/>
@@ -5774,7 +5775,7 @@
           <p:cNvPr id="2" name="Titel 1">
             <a:extLst>
               <a:ext uri="{FF2B5EF4-FFF2-40B4-BE49-F238E27FC236}">
-                <a16:creationId xmlns:a16="http://schemas.microsoft.com/office/drawing/2014/main" id="{F92F526B-5A61-4E25-8575-D6BA60A6E06F}"/>
+                <a16:creationId xmlns:a16="http://schemas.microsoft.com/office/drawing/2014/main" id="{3BB27D91-AB37-4D79-8AB1-A0B70189971A}"/>
               </a:ext>
             </a:extLst>
           </p:cNvPr>
@@ -5802,7 +5803,7 @@
           <p:cNvPr id="3" name="Untertitel 2">
             <a:extLst>
               <a:ext uri="{FF2B5EF4-FFF2-40B4-BE49-F238E27FC236}">
-                <a16:creationId xmlns:a16="http://schemas.microsoft.com/office/drawing/2014/main" id="{FAAA2A0C-B527-49EB-85C3-1665DAE1CE14}"/>
+                <a16:creationId xmlns:a16="http://schemas.microsoft.com/office/drawing/2014/main" id="{2052D207-D4CB-49AF-BF7A-4FEDDB3860E2}"/>
               </a:ext>
             </a:extLst>
           </p:cNvPr>
@@ -5818,14 +5819,352 @@
           <a:bodyPr/>
           <a:lstStyle/>
           <a:p>
-            <a:endParaRPr lang="de-DE" dirty="0"/>
+            <a:r>
+              <a:rPr lang="de-DE" dirty="0"/>
+              <a:t>WPF DX</a:t>
+            </a:r>
           </a:p>
         </p:txBody>
       </p:sp>
     </p:spTree>
     <p:extLst>
       <p:ext uri="{BB962C8B-B14F-4D97-AF65-F5344CB8AC3E}">
-        <p14:creationId xmlns:p14="http://schemas.microsoft.com/office/powerpoint/2010/main" val="3837964694"/>
+        <p14:creationId xmlns:p14="http://schemas.microsoft.com/office/powerpoint/2010/main" val="1528930922"/>
+      </p:ext>
+    </p:extLst>
+  </p:cSld>
+  <p:clrMapOvr>
+    <a:masterClrMapping/>
+  </p:clrMapOvr>
+</p:sld>
+</file>
+
+<file path=ppt/slides/slide2.xml><?xml version="1.0" encoding="utf-8"?>
+<p:sld xmlns:a="http://schemas.openxmlformats.org/drawingml/2006/main" xmlns:r="http://schemas.openxmlformats.org/officeDocument/2006/relationships" xmlns:p="http://schemas.openxmlformats.org/presentationml/2006/main">
+  <p:cSld>
+    <p:spTree>
+      <p:nvGrpSpPr>
+        <p:cNvPr id="1" name=""/>
+        <p:cNvGrpSpPr/>
+        <p:nvPr/>
+      </p:nvGrpSpPr>
+      <p:grpSpPr>
+        <a:xfrm>
+          <a:off x="0" y="0"/>
+          <a:ext cx="0" cy="0"/>
+          <a:chOff x="0" y="0"/>
+          <a:chExt cx="0" cy="0"/>
+        </a:xfrm>
+      </p:grpSpPr>
+      <p:sp>
+        <p:nvSpPr>
+          <p:cNvPr id="2" name="Titel 1">
+            <a:extLst>
+              <a:ext uri="{FF2B5EF4-FFF2-40B4-BE49-F238E27FC236}">
+                <a16:creationId xmlns:a16="http://schemas.microsoft.com/office/drawing/2014/main" id="{F046EBBC-EE0B-4B47-87CE-F459CDD20790}"/>
+              </a:ext>
+            </a:extLst>
+          </p:cNvPr>
+          <p:cNvSpPr>
+            <a:spLocks noGrp="1"/>
+          </p:cNvSpPr>
+          <p:nvPr>
+            <p:ph type="title"/>
+          </p:nvPr>
+        </p:nvSpPr>
+        <p:spPr>
+          <a:xfrm>
+            <a:off x="685801" y="609601"/>
+            <a:ext cx="10131425" cy="457200"/>
+          </a:xfrm>
+        </p:spPr>
+        <p:txBody>
+          <a:bodyPr>
+            <a:normAutofit fontScale="90000"/>
+          </a:bodyPr>
+          <a:lstStyle/>
+          <a:p>
+            <a:r>
+              <a:rPr lang="de-DE" dirty="0"/>
+              <a:t>Docking</a:t>
+            </a:r>
+          </a:p>
+        </p:txBody>
+      </p:sp>
+      <p:sp>
+        <p:nvSpPr>
+          <p:cNvPr id="4" name="Rechteck 3">
+            <a:extLst>
+              <a:ext uri="{FF2B5EF4-FFF2-40B4-BE49-F238E27FC236}">
+                <a16:creationId xmlns:a16="http://schemas.microsoft.com/office/drawing/2014/main" id="{850398A4-7630-4E5A-AA0A-54E2DC173C64}"/>
+              </a:ext>
+            </a:extLst>
+          </p:cNvPr>
+          <p:cNvSpPr/>
+          <p:nvPr/>
+        </p:nvSpPr>
+        <p:spPr>
+          <a:xfrm>
+            <a:off x="1268628" y="1655806"/>
+            <a:ext cx="1227438" cy="621957"/>
+          </a:xfrm>
+          <a:prstGeom prst="rect">
+            <a:avLst/>
+          </a:prstGeom>
+        </p:spPr>
+        <p:style>
+          <a:lnRef idx="2">
+            <a:schemeClr val="accent1">
+              <a:shade val="50000"/>
+            </a:schemeClr>
+          </a:lnRef>
+          <a:fillRef idx="1">
+            <a:schemeClr val="accent1"/>
+          </a:fillRef>
+          <a:effectRef idx="0">
+            <a:schemeClr val="accent1"/>
+          </a:effectRef>
+          <a:fontRef idx="minor">
+            <a:schemeClr val="lt1"/>
+          </a:fontRef>
+        </p:style>
+        <p:txBody>
+          <a:bodyPr rtlCol="0" anchor="ctr"/>
+          <a:lstStyle/>
+          <a:p>
+            <a:pPr algn="ctr"/>
+            <a:r>
+              <a:rPr lang="de-DE" sz="1400" dirty="0" err="1"/>
+              <a:t>IShell</a:t>
+            </a:r>
+            <a:endParaRPr lang="de-DE" sz="1400" dirty="0"/>
+          </a:p>
+        </p:txBody>
+      </p:sp>
+      <p:sp>
+        <p:nvSpPr>
+          <p:cNvPr id="5" name="Rechteck 4">
+            <a:extLst>
+              <a:ext uri="{FF2B5EF4-FFF2-40B4-BE49-F238E27FC236}">
+                <a16:creationId xmlns:a16="http://schemas.microsoft.com/office/drawing/2014/main" id="{C76C28BC-2470-49B3-AB5E-60D5DB8DF317}"/>
+              </a:ext>
+            </a:extLst>
+          </p:cNvPr>
+          <p:cNvSpPr/>
+          <p:nvPr/>
+        </p:nvSpPr>
+        <p:spPr>
+          <a:xfrm>
+            <a:off x="1833672" y="2807043"/>
+            <a:ext cx="1324787" cy="621957"/>
+          </a:xfrm>
+          <a:prstGeom prst="rect">
+            <a:avLst/>
+          </a:prstGeom>
+        </p:spPr>
+        <p:style>
+          <a:lnRef idx="2">
+            <a:schemeClr val="accent1">
+              <a:shade val="50000"/>
+            </a:schemeClr>
+          </a:lnRef>
+          <a:fillRef idx="1">
+            <a:schemeClr val="accent1"/>
+          </a:fillRef>
+          <a:effectRef idx="0">
+            <a:schemeClr val="accent1"/>
+          </a:effectRef>
+          <a:fontRef idx="minor">
+            <a:schemeClr val="lt1"/>
+          </a:fontRef>
+        </p:style>
+        <p:txBody>
+          <a:bodyPr rtlCol="0" anchor="ctr"/>
+          <a:lstStyle/>
+          <a:p>
+            <a:pPr algn="ctr"/>
+            <a:r>
+              <a:rPr lang="de-DE" sz="1200" dirty="0" err="1"/>
+              <a:t>IDockable</a:t>
+            </a:r>
+            <a:endParaRPr lang="de-DE" sz="1200" dirty="0"/>
+          </a:p>
+          <a:p>
+            <a:pPr algn="ctr"/>
+            <a:r>
+              <a:rPr lang="de-DE" sz="1200" dirty="0"/>
+              <a:t>Item</a:t>
+            </a:r>
+          </a:p>
+        </p:txBody>
+      </p:sp>
+      <p:sp>
+        <p:nvSpPr>
+          <p:cNvPr id="6" name="Rechteck 5">
+            <a:extLst>
+              <a:ext uri="{FF2B5EF4-FFF2-40B4-BE49-F238E27FC236}">
+                <a16:creationId xmlns:a16="http://schemas.microsoft.com/office/drawing/2014/main" id="{A9699FAA-E3C6-472F-92EC-ADC9D4209FAF}"/>
+              </a:ext>
+            </a:extLst>
+          </p:cNvPr>
+          <p:cNvSpPr/>
+          <p:nvPr/>
+        </p:nvSpPr>
+        <p:spPr>
+          <a:xfrm>
+            <a:off x="1113612" y="3910913"/>
+            <a:ext cx="1324787" cy="621957"/>
+          </a:xfrm>
+          <a:prstGeom prst="rect">
+            <a:avLst/>
+          </a:prstGeom>
+        </p:spPr>
+        <p:style>
+          <a:lnRef idx="2">
+            <a:schemeClr val="accent1">
+              <a:shade val="50000"/>
+            </a:schemeClr>
+          </a:lnRef>
+          <a:fillRef idx="1">
+            <a:schemeClr val="accent1"/>
+          </a:fillRef>
+          <a:effectRef idx="0">
+            <a:schemeClr val="accent1"/>
+          </a:effectRef>
+          <a:fontRef idx="minor">
+            <a:schemeClr val="lt1"/>
+          </a:fontRef>
+        </p:style>
+        <p:txBody>
+          <a:bodyPr rtlCol="0" anchor="ctr"/>
+          <a:lstStyle/>
+          <a:p>
+            <a:pPr algn="ctr"/>
+            <a:r>
+              <a:rPr lang="de-DE" sz="1200" dirty="0" err="1"/>
+              <a:t>IDocument</a:t>
+            </a:r>
+            <a:endParaRPr lang="de-DE" sz="1200" dirty="0"/>
+          </a:p>
+          <a:p>
+            <a:pPr algn="ctr"/>
+            <a:r>
+              <a:rPr lang="de-DE" sz="1200" dirty="0"/>
+              <a:t>Item</a:t>
+            </a:r>
+          </a:p>
+        </p:txBody>
+      </p:sp>
+      <p:sp>
+        <p:nvSpPr>
+          <p:cNvPr id="7" name="Rechteck 6">
+            <a:extLst>
+              <a:ext uri="{FF2B5EF4-FFF2-40B4-BE49-F238E27FC236}">
+                <a16:creationId xmlns:a16="http://schemas.microsoft.com/office/drawing/2014/main" id="{26D38652-AD01-4680-A9B4-1F822304258C}"/>
+              </a:ext>
+            </a:extLst>
+          </p:cNvPr>
+          <p:cNvSpPr/>
+          <p:nvPr/>
+        </p:nvSpPr>
+        <p:spPr>
+          <a:xfrm>
+            <a:off x="2818845" y="3910913"/>
+            <a:ext cx="1324787" cy="621957"/>
+          </a:xfrm>
+          <a:prstGeom prst="rect">
+            <a:avLst/>
+          </a:prstGeom>
+        </p:spPr>
+        <p:style>
+          <a:lnRef idx="2">
+            <a:schemeClr val="accent1">
+              <a:shade val="50000"/>
+            </a:schemeClr>
+          </a:lnRef>
+          <a:fillRef idx="1">
+            <a:schemeClr val="accent1"/>
+          </a:fillRef>
+          <a:effectRef idx="0">
+            <a:schemeClr val="accent1"/>
+          </a:effectRef>
+          <a:fontRef idx="minor">
+            <a:schemeClr val="lt1"/>
+          </a:fontRef>
+        </p:style>
+        <p:txBody>
+          <a:bodyPr rtlCol="0" anchor="ctr"/>
+          <a:lstStyle/>
+          <a:p>
+            <a:pPr algn="ctr"/>
+            <a:r>
+              <a:rPr lang="de-DE" sz="1200" dirty="0" err="1"/>
+              <a:t>IToolItem</a:t>
+            </a:r>
+            <a:endParaRPr lang="de-DE" sz="1200" dirty="0"/>
+          </a:p>
+        </p:txBody>
+      </p:sp>
+      <p:sp>
+        <p:nvSpPr>
+          <p:cNvPr id="8" name="Rechteck 7">
+            <a:extLst>
+              <a:ext uri="{FF2B5EF4-FFF2-40B4-BE49-F238E27FC236}">
+                <a16:creationId xmlns:a16="http://schemas.microsoft.com/office/drawing/2014/main" id="{C7DAC2DC-3B06-4DED-8DBA-C39558982711}"/>
+              </a:ext>
+            </a:extLst>
+          </p:cNvPr>
+          <p:cNvSpPr/>
+          <p:nvPr/>
+        </p:nvSpPr>
+        <p:spPr>
+          <a:xfrm>
+            <a:off x="5389048" y="1655806"/>
+            <a:ext cx="1227439" cy="621957"/>
+          </a:xfrm>
+          <a:prstGeom prst="rect">
+            <a:avLst/>
+          </a:prstGeom>
+        </p:spPr>
+        <p:style>
+          <a:lnRef idx="2">
+            <a:schemeClr val="accent1">
+              <a:shade val="50000"/>
+            </a:schemeClr>
+          </a:lnRef>
+          <a:fillRef idx="1">
+            <a:schemeClr val="accent1"/>
+          </a:fillRef>
+          <a:effectRef idx="0">
+            <a:schemeClr val="accent1"/>
+          </a:effectRef>
+          <a:fontRef idx="minor">
+            <a:schemeClr val="lt1"/>
+          </a:fontRef>
+        </p:style>
+        <p:txBody>
+          <a:bodyPr rtlCol="0" anchor="ctr"/>
+          <a:lstStyle/>
+          <a:p>
+            <a:pPr algn="ctr"/>
+            <a:r>
+              <a:rPr lang="de-DE" sz="1400" dirty="0"/>
+              <a:t>Layout</a:t>
+            </a:r>
+          </a:p>
+          <a:p>
+            <a:pPr algn="ctr"/>
+            <a:r>
+              <a:rPr lang="de-DE" sz="1400" dirty="0"/>
+              <a:t>Manager</a:t>
+            </a:r>
+          </a:p>
+        </p:txBody>
+      </p:sp>
+    </p:spTree>
+    <p:extLst>
+      <p:ext uri="{BB962C8B-B14F-4D97-AF65-F5344CB8AC3E}">
+        <p14:creationId xmlns:p14="http://schemas.microsoft.com/office/powerpoint/2010/main" val="1066858575"/>
       </p:ext>
     </p:extLst>
   </p:cSld>
@@ -5846,34 +6185,34 @@
         <a:sysClr val="window" lastClr="FFFFFF"/>
       </a:lt1>
       <a:dk2>
-        <a:srgbClr val="18276C"/>
+        <a:srgbClr val="104C7E"/>
       </a:dk2>
       <a:lt2>
         <a:srgbClr val="EBEBEB"/>
       </a:lt2>
       <a:accent1>
-        <a:srgbClr val="AC3EC1"/>
+        <a:srgbClr val="94CE67"/>
       </a:accent1>
       <a:accent2>
-        <a:srgbClr val="477BD1"/>
+        <a:srgbClr val="49D1CD"/>
       </a:accent2>
       <a:accent3>
-        <a:srgbClr val="46B298"/>
+        <a:srgbClr val="61A5D6"/>
       </a:accent3>
       <a:accent4>
-        <a:srgbClr val="90BA4C"/>
+        <a:srgbClr val="9D8CD3"/>
       </a:accent4>
       <a:accent5>
-        <a:srgbClr val="DD9D31"/>
+        <a:srgbClr val="E45C8A"/>
       </a:accent5>
       <a:accent6>
-        <a:srgbClr val="E25247"/>
+        <a:srgbClr val="F98C61"/>
       </a:accent6>
       <a:hlink>
-        <a:srgbClr val="C573D2"/>
+        <a:srgbClr val="AAF172"/>
       </a:hlink>
       <a:folHlink>
-        <a:srgbClr val="CCAEE8"/>
+        <a:srgbClr val="E7F19A"/>
       </a:folHlink>
     </a:clrScheme>
     <a:fontScheme name="Celestial">
@@ -6078,7 +6417,7 @@
   <a:extraClrSchemeLst/>
   <a:extLst>
     <a:ext uri="{05A4C25C-085E-4340-85A3-A5531E510DB2}">
-      <thm15:themeFamily xmlns:thm15="http://schemas.microsoft.com/office/thememl/2012/main" name="Celestial" id="{C4BB2A3D-0E93-4C5F-B0D2-9D3FCE089CC5}" vid="{42E5908D-19A2-46FD-89FA-638B126129EF}"/>
+      <thm15:themeFamily xmlns:thm15="http://schemas.microsoft.com/office/thememl/2012/main" name="Celestial" id="{C4BB2A3D-0E93-4C5F-B0D2-9D3FCE089CC5}" vid="{E44E6A2F-09CD-4BE0-B42D-107FF03CEED6}"/>
     </a:ext>
   </a:extLst>
 </a:theme>

</xml_diff>